<commit_message>
Update IBM Capstone Project - The Battle of Neighborhoods.pptx
</commit_message>
<xml_diff>
--- a/IBM Capstone Project - The Battle of Neighborhoods.pptx
+++ b/IBM Capstone Project - The Battle of Neighborhoods.pptx
@@ -12,13 +12,20 @@
     <p:sldId id="259" r:id="rId6"/>
     <p:sldId id="261" r:id="rId7"/>
     <p:sldId id="262" r:id="rId8"/>
-    <p:sldId id="264" r:id="rId9"/>
-    <p:sldId id="266" r:id="rId10"/>
-    <p:sldId id="267" r:id="rId11"/>
-    <p:sldId id="263" r:id="rId12"/>
-    <p:sldId id="265" r:id="rId13"/>
-    <p:sldId id="268" r:id="rId14"/>
-    <p:sldId id="269" r:id="rId15"/>
+    <p:sldId id="270" r:id="rId9"/>
+    <p:sldId id="264" r:id="rId10"/>
+    <p:sldId id="272" r:id="rId11"/>
+    <p:sldId id="271" r:id="rId12"/>
+    <p:sldId id="266" r:id="rId13"/>
+    <p:sldId id="273" r:id="rId14"/>
+    <p:sldId id="267" r:id="rId15"/>
+    <p:sldId id="274" r:id="rId16"/>
+    <p:sldId id="263" r:id="rId17"/>
+    <p:sldId id="265" r:id="rId18"/>
+    <p:sldId id="275" r:id="rId19"/>
+    <p:sldId id="268" r:id="rId20"/>
+    <p:sldId id="276" r:id="rId21"/>
+    <p:sldId id="269" r:id="rId22"/>
   </p:sldIdLst>
   <p:sldSz cx="12192000" cy="6858000"/>
   <p:notesSz cx="6858000" cy="9144000"/>
@@ -117,6 +124,11 @@
       </a:defRPr>
     </a:lvl9pPr>
   </p:defaultTextStyle>
+  <p:extLst>
+    <p:ext uri="{EFAFB233-063F-42B5-8137-9DF3F51BA10A}">
+      <p15:sldGuideLst xmlns:p15="http://schemas.microsoft.com/office/powerpoint/2012/main"/>
+    </p:ext>
+  </p:extLst>
 </p:presentation>
 </file>
 
@@ -333,7 +345,7 @@
           <a:p>
             <a:fld id="{3B3774A6-5DFA-41B2-94B7-AD66C0CCAD44}" type="datetimeFigureOut">
               <a:rPr lang="en-US" smtClean="0"/>
-              <a:t>5/26/2020</a:t>
+              <a:t>5/27/2020</a:t>
             </a:fld>
             <a:endParaRPr lang="en-US"/>
           </a:p>
@@ -629,7 +641,7 @@
           <a:p>
             <a:fld id="{3B3774A6-5DFA-41B2-94B7-AD66C0CCAD44}" type="datetimeFigureOut">
               <a:rPr lang="en-US" smtClean="0"/>
-              <a:t>5/26/2020</a:t>
+              <a:t>5/27/2020</a:t>
             </a:fld>
             <a:endParaRPr lang="en-US"/>
           </a:p>
@@ -888,7 +900,7 @@
           <a:p>
             <a:fld id="{3B3774A6-5DFA-41B2-94B7-AD66C0CCAD44}" type="datetimeFigureOut">
               <a:rPr lang="en-US" smtClean="0"/>
-              <a:t>5/26/2020</a:t>
+              <a:t>5/27/2020</a:t>
             </a:fld>
             <a:endParaRPr lang="en-US"/>
           </a:p>
@@ -1357,7 +1369,7 @@
           <a:p>
             <a:fld id="{3B3774A6-5DFA-41B2-94B7-AD66C0CCAD44}" type="datetimeFigureOut">
               <a:rPr lang="en-US" smtClean="0"/>
-              <a:t>5/26/2020</a:t>
+              <a:t>5/27/2020</a:t>
             </a:fld>
             <a:endParaRPr lang="en-US"/>
           </a:p>
@@ -1537,7 +1549,7 @@
           <a:p>
             <a:fld id="{3B3774A6-5DFA-41B2-94B7-AD66C0CCAD44}" type="datetimeFigureOut">
               <a:rPr lang="en-US" smtClean="0"/>
-              <a:t>5/26/2020</a:t>
+              <a:t>5/27/2020</a:t>
             </a:fld>
             <a:endParaRPr lang="en-US"/>
           </a:p>
@@ -2113,7 +2125,7 @@
           <a:p>
             <a:fld id="{3B3774A6-5DFA-41B2-94B7-AD66C0CCAD44}" type="datetimeFigureOut">
               <a:rPr lang="en-US" smtClean="0"/>
-              <a:t>5/26/2020</a:t>
+              <a:t>5/27/2020</a:t>
             </a:fld>
             <a:endParaRPr lang="en-US"/>
           </a:p>
@@ -2445,7 +2457,7 @@
           <a:p>
             <a:fld id="{3B3774A6-5DFA-41B2-94B7-AD66C0CCAD44}" type="datetimeFigureOut">
               <a:rPr lang="en-US" smtClean="0"/>
-              <a:t>5/26/2020</a:t>
+              <a:t>5/27/2020</a:t>
             </a:fld>
             <a:endParaRPr lang="en-US"/>
           </a:p>
@@ -2620,7 +2632,7 @@
           <a:p>
             <a:fld id="{3B3774A6-5DFA-41B2-94B7-AD66C0CCAD44}" type="datetimeFigureOut">
               <a:rPr lang="en-US" smtClean="0"/>
-              <a:t>5/26/2020</a:t>
+              <a:t>5/27/2020</a:t>
             </a:fld>
             <a:endParaRPr lang="en-US"/>
           </a:p>
@@ -2800,7 +2812,7 @@
           <a:p>
             <a:fld id="{3B3774A6-5DFA-41B2-94B7-AD66C0CCAD44}" type="datetimeFigureOut">
               <a:rPr lang="en-US" smtClean="0"/>
-              <a:t>5/26/2020</a:t>
+              <a:t>5/27/2020</a:t>
             </a:fld>
             <a:endParaRPr lang="en-US"/>
           </a:p>
@@ -2975,7 +2987,7 @@
           <a:p>
             <a:fld id="{3B3774A6-5DFA-41B2-94B7-AD66C0CCAD44}" type="datetimeFigureOut">
               <a:rPr lang="en-US" smtClean="0"/>
-              <a:t>5/26/2020</a:t>
+              <a:t>5/27/2020</a:t>
             </a:fld>
             <a:endParaRPr lang="en-US"/>
           </a:p>
@@ -3232,7 +3244,7 @@
           <a:p>
             <a:fld id="{3B3774A6-5DFA-41B2-94B7-AD66C0CCAD44}" type="datetimeFigureOut">
               <a:rPr lang="en-US" smtClean="0"/>
-              <a:t>5/26/2020</a:t>
+              <a:t>5/27/2020</a:t>
             </a:fld>
             <a:endParaRPr lang="en-US"/>
           </a:p>
@@ -3529,7 +3541,7 @@
           <a:p>
             <a:fld id="{3B3774A6-5DFA-41B2-94B7-AD66C0CCAD44}" type="datetimeFigureOut">
               <a:rPr lang="en-US" smtClean="0"/>
-              <a:t>5/26/2020</a:t>
+              <a:t>5/27/2020</a:t>
             </a:fld>
             <a:endParaRPr lang="en-US"/>
           </a:p>
@@ -3959,7 +3971,7 @@
           <a:p>
             <a:fld id="{3B3774A6-5DFA-41B2-94B7-AD66C0CCAD44}" type="datetimeFigureOut">
               <a:rPr lang="en-US" smtClean="0"/>
-              <a:t>5/26/2020</a:t>
+              <a:t>5/27/2020</a:t>
             </a:fld>
             <a:endParaRPr lang="en-US"/>
           </a:p>
@@ -4077,7 +4089,7 @@
           <a:p>
             <a:fld id="{3B3774A6-5DFA-41B2-94B7-AD66C0CCAD44}" type="datetimeFigureOut">
               <a:rPr lang="en-US" smtClean="0"/>
-              <a:t>5/26/2020</a:t>
+              <a:t>5/27/2020</a:t>
             </a:fld>
             <a:endParaRPr lang="en-US"/>
           </a:p>
@@ -4172,7 +4184,7 @@
           <a:p>
             <a:fld id="{3B3774A6-5DFA-41B2-94B7-AD66C0CCAD44}" type="datetimeFigureOut">
               <a:rPr lang="en-US" smtClean="0"/>
-              <a:t>5/26/2020</a:t>
+              <a:t>5/27/2020</a:t>
             </a:fld>
             <a:endParaRPr lang="en-US"/>
           </a:p>
@@ -4455,7 +4467,7 @@
           <a:p>
             <a:fld id="{3B3774A6-5DFA-41B2-94B7-AD66C0CCAD44}" type="datetimeFigureOut">
               <a:rPr lang="en-US" smtClean="0"/>
-              <a:t>5/26/2020</a:t>
+              <a:t>5/27/2020</a:t>
             </a:fld>
             <a:endParaRPr lang="en-US"/>
           </a:p>
@@ -4746,7 +4758,7 @@
           <a:p>
             <a:fld id="{3B3774A6-5DFA-41B2-94B7-AD66C0CCAD44}" type="datetimeFigureOut">
               <a:rPr lang="en-US" smtClean="0"/>
-              <a:t>5/26/2020</a:t>
+              <a:t>5/27/2020</a:t>
             </a:fld>
             <a:endParaRPr lang="en-US"/>
           </a:p>
@@ -4977,7 +4989,7 @@
           <a:p>
             <a:fld id="{3B3774A6-5DFA-41B2-94B7-AD66C0CCAD44}" type="datetimeFigureOut">
               <a:rPr lang="en-US" smtClean="0"/>
-              <a:t>5/26/2020</a:t>
+              <a:t>5/27/2020</a:t>
             </a:fld>
             <a:endParaRPr lang="en-US"/>
           </a:p>
@@ -5865,96 +5877,53 @@
           <a:lstStyle/>
           <a:p>
             <a:r>
-              <a:rPr lang="en-US" b="1" dirty="0">
-                <a:effectLst/>
-              </a:rPr>
-              <a:t>Data Analysis</a:t>
-            </a:r>
-            <a:endParaRPr lang="en-US" b="1" dirty="0"/>
-          </a:p>
-        </p:txBody>
-      </p:sp>
-      <p:sp>
-        <p:nvSpPr>
-          <p:cNvPr id="3" name="Content Placeholder 2"/>
-          <p:cNvSpPr>
-            <a:spLocks noGrp="1"/>
-          </p:cNvSpPr>
+              <a:rPr lang="en-US" b="1" dirty="0"/>
+              <a:t>Neighborhoods with highest </a:t>
+            </a:r>
+            <a:r>
+              <a:rPr lang="en-US" b="1" dirty="0" smtClean="0"/>
+              <a:t>crime</a:t>
+            </a:r>
+            <a:endParaRPr lang="en-US" dirty="0"/>
+          </a:p>
+        </p:txBody>
+      </p:sp>
+      <p:pic>
+        <p:nvPicPr>
+          <p:cNvPr id="4" name="Content Placeholder 3"/>
+          <p:cNvPicPr>
+            <a:picLocks noGrp="1" noChangeAspect="1"/>
+          </p:cNvPicPr>
           <p:nvPr>
             <p:ph idx="1"/>
           </p:nvPr>
-        </p:nvSpPr>
-        <p:spPr/>
-        <p:txBody>
-          <a:bodyPr/>
-          <a:lstStyle/>
-          <a:p>
-            <a:r>
-              <a:rPr lang="en-US" dirty="0"/>
-              <a:t>Part 4: </a:t>
-            </a:r>
-            <a:endParaRPr lang="en-US" dirty="0" smtClean="0"/>
-          </a:p>
-          <a:p>
-            <a:pPr lvl="1"/>
-            <a:r>
-              <a:rPr lang="en-US" dirty="0" smtClean="0"/>
-              <a:t>Creating </a:t>
-            </a:r>
-            <a:r>
-              <a:rPr lang="en-US" dirty="0"/>
-              <a:t>a new consolidated dataset of the Neighborhoods, boroughs, and the most common venues and the respective </a:t>
-            </a:r>
-            <a:r>
-              <a:rPr lang="en-US" dirty="0" err="1"/>
-              <a:t>Neighbourhood</a:t>
-            </a:r>
-            <a:r>
-              <a:rPr lang="en-US" dirty="0"/>
-              <a:t> along with co-ordinates.:</a:t>
-            </a:r>
-          </a:p>
-          <a:p>
-            <a:r>
-              <a:rPr lang="en-US" dirty="0"/>
-              <a:t>This data will be fetched using Four Square API to explore the </a:t>
-            </a:r>
-            <a:r>
-              <a:rPr lang="en-US" dirty="0" err="1"/>
-              <a:t>neighbourhood</a:t>
-            </a:r>
-            <a:r>
-              <a:rPr lang="en-US" dirty="0"/>
-              <a:t> venues and to apply machine learning algorithm to cluster the </a:t>
-            </a:r>
-            <a:r>
-              <a:rPr lang="en-US" dirty="0" err="1"/>
-              <a:t>neighbourhoods</a:t>
-            </a:r>
-            <a:r>
-              <a:rPr lang="en-US" dirty="0"/>
-              <a:t> and present the findings by plotting it on maps using Folium.</a:t>
-            </a:r>
-          </a:p>
-        </p:txBody>
-      </p:sp>
+        </p:nvPicPr>
+        <p:blipFill>
+          <a:blip r:embed="rId2"/>
+          <a:stretch>
+            <a:fillRect/>
+          </a:stretch>
+        </p:blipFill>
+        <p:spPr>
+          <a:xfrm>
+            <a:off x="1141413" y="2681287"/>
+            <a:ext cx="9905998" cy="3980770"/>
+          </a:xfrm>
+          <a:prstGeom prst="rect">
+            <a:avLst/>
+          </a:prstGeom>
+        </p:spPr>
+      </p:pic>
     </p:spTree>
     <p:extLst>
       <p:ext uri="{BB962C8B-B14F-4D97-AF65-F5344CB8AC3E}">
-        <p14:creationId xmlns:p14="http://schemas.microsoft.com/office/powerpoint/2010/main" val="3658460567"/>
+        <p14:creationId xmlns:p14="http://schemas.microsoft.com/office/powerpoint/2010/main" val="53378587"/>
       </p:ext>
     </p:extLst>
   </p:cSld>
   <p:clrMapOvr>
     <a:masterClrMapping/>
   </p:clrMapOvr>
-  <p:timing>
-    <p:tnLst>
-      <p:par>
-        <p:cTn id="1" dur="indefinite" restart="never" nodeType="tmRoot"/>
-      </p:par>
-    </p:tnLst>
-  </p:timing>
 </p:sld>
 </file>
 
@@ -5991,18 +5960,9 @@
           <a:lstStyle/>
           <a:p>
             <a:r>
-              <a:rPr lang="en-US" b="1" dirty="0">
-                <a:effectLst/>
-              </a:rPr>
-              <a:t>Importing </a:t>
-            </a:r>
-            <a:r>
-              <a:rPr lang="en-US" b="1" dirty="0" smtClean="0">
-                <a:effectLst/>
-              </a:rPr>
-              <a:t>Libraries</a:t>
-            </a:r>
-            <a:endParaRPr lang="en-US" b="1" dirty="0"/>
+              <a:rPr lang="en-US" dirty="0"/>
+              <a:t>Different Kind of Crimes in West Side Borough</a:t>
+            </a:r>
           </a:p>
         </p:txBody>
       </p:sp>
@@ -6018,8 +5978,8 @@
         </p:nvSpPr>
         <p:spPr>
           <a:xfrm>
-            <a:off x="1141413" y="2666999"/>
-            <a:ext cx="9905998" cy="3893821"/>
+            <a:off x="1141413" y="2183673"/>
+            <a:ext cx="8747170" cy="1108167"/>
           </a:xfrm>
         </p:spPr>
         <p:txBody>
@@ -6029,105 +5989,82 @@
           <a:lstStyle/>
           <a:p>
             <a:r>
-              <a:rPr lang="en-US" dirty="0" err="1">
-                <a:effectLst/>
-              </a:rPr>
-              <a:t>numpy</a:t>
-            </a:r>
-            <a:endParaRPr lang="en-US" dirty="0">
-              <a:effectLst/>
-            </a:endParaRPr>
-          </a:p>
-          <a:p>
-            <a:r>
-              <a:rPr lang="en-US" dirty="0">
-                <a:effectLst/>
-              </a:rPr>
-              <a:t>pandas</a:t>
-            </a:r>
-          </a:p>
-          <a:p>
-            <a:r>
-              <a:rPr lang="en-US" dirty="0" err="1">
-                <a:effectLst/>
-              </a:rPr>
-              <a:t>opencage</a:t>
-            </a:r>
-            <a:endParaRPr lang="en-US" dirty="0">
-              <a:effectLst/>
-            </a:endParaRPr>
-          </a:p>
-          <a:p>
-            <a:r>
-              <a:rPr lang="en-US" dirty="0" err="1">
-                <a:effectLst/>
-              </a:rPr>
-              <a:t>matplotlib</a:t>
-            </a:r>
-            <a:endParaRPr lang="en-US" dirty="0">
-              <a:effectLst/>
-            </a:endParaRPr>
-          </a:p>
-          <a:p>
-            <a:r>
-              <a:rPr lang="en-US" dirty="0">
-                <a:effectLst/>
-              </a:rPr>
-              <a:t>folium</a:t>
-            </a:r>
-          </a:p>
-          <a:p>
-            <a:r>
-              <a:rPr lang="en-US" dirty="0">
-                <a:effectLst/>
-              </a:rPr>
-              <a:t>requests</a:t>
-            </a:r>
-          </a:p>
-          <a:p>
-            <a:r>
-              <a:rPr lang="en-US" dirty="0" smtClean="0">
-                <a:effectLst/>
-              </a:rPr>
-              <a:t>pandas.io</a:t>
-            </a:r>
-            <a:endParaRPr lang="en-US" dirty="0">
-              <a:effectLst/>
-            </a:endParaRPr>
-          </a:p>
-          <a:p>
-            <a:r>
-              <a:rPr lang="en-US" dirty="0" err="1">
-                <a:effectLst/>
-              </a:rPr>
-              <a:t>sklearn</a:t>
-            </a:r>
-            <a:endParaRPr lang="en-US" dirty="0">
-              <a:effectLst/>
-            </a:endParaRPr>
-          </a:p>
-          <a:p>
-            <a:endParaRPr lang="en-US" dirty="0"/>
-          </a:p>
-        </p:txBody>
-      </p:sp>
+              <a:rPr lang="en-US" dirty="0"/>
+              <a:t>By taking </a:t>
+            </a:r>
+            <a:r>
+              <a:rPr lang="en-US" dirty="0" smtClean="0"/>
+              <a:t>West </a:t>
+            </a:r>
+            <a:r>
+              <a:rPr lang="en-US" dirty="0"/>
+              <a:t>Side </a:t>
+            </a:r>
+            <a:r>
+              <a:rPr lang="en-US" dirty="0" smtClean="0"/>
+              <a:t>as an example:</a:t>
+            </a:r>
+          </a:p>
+          <a:p>
+            <a:r>
+              <a:rPr lang="en-US" dirty="0" smtClean="0"/>
+              <a:t>Can get the </a:t>
+            </a:r>
+            <a:r>
+              <a:rPr lang="en-US" dirty="0"/>
+              <a:t>Different Kind of </a:t>
+            </a:r>
+            <a:r>
+              <a:rPr lang="en-US" dirty="0" smtClean="0"/>
+              <a:t>Crimes In this </a:t>
+            </a:r>
+            <a:r>
+              <a:rPr lang="en-US" dirty="0"/>
+              <a:t>Borough</a:t>
+            </a:r>
+          </a:p>
+        </p:txBody>
+      </p:sp>
+      <p:pic>
+        <p:nvPicPr>
+          <p:cNvPr id="4" name="Picture 3"/>
+          <p:cNvPicPr>
+            <a:picLocks noChangeAspect="1"/>
+          </p:cNvPicPr>
+          <p:nvPr/>
+        </p:nvPicPr>
+        <p:blipFill>
+          <a:blip r:embed="rId2">
+            <a:extLst>
+              <a:ext uri="{28A0092B-C50C-407E-A947-70E740481C1C}">
+                <a14:useLocalDpi xmlns:a14="http://schemas.microsoft.com/office/drawing/2010/main" val="0"/>
+              </a:ext>
+            </a:extLst>
+          </a:blip>
+          <a:stretch>
+            <a:fillRect/>
+          </a:stretch>
+        </p:blipFill>
+        <p:spPr>
+          <a:xfrm>
+            <a:off x="1141413" y="3400969"/>
+            <a:ext cx="9905998" cy="3295650"/>
+          </a:xfrm>
+          <a:prstGeom prst="rect">
+            <a:avLst/>
+          </a:prstGeom>
+        </p:spPr>
+      </p:pic>
     </p:spTree>
     <p:extLst>
       <p:ext uri="{BB962C8B-B14F-4D97-AF65-F5344CB8AC3E}">
-        <p14:creationId xmlns:p14="http://schemas.microsoft.com/office/powerpoint/2010/main" val="3141356143"/>
+        <p14:creationId xmlns:p14="http://schemas.microsoft.com/office/powerpoint/2010/main" val="161598040"/>
       </p:ext>
     </p:extLst>
   </p:cSld>
   <p:clrMapOvr>
     <a:masterClrMapping/>
   </p:clrMapOvr>
-  <p:timing>
-    <p:tnLst>
-      <p:par>
-        <p:cTn id="1" dur="indefinite" restart="never" nodeType="tmRoot"/>
-      </p:par>
-    </p:tnLst>
-  </p:timing>
 </p:sld>
 </file>
 
@@ -6164,10 +6101,12 @@
           <a:lstStyle/>
           <a:p>
             <a:r>
-              <a:rPr lang="en-US" b="1" dirty="0" smtClean="0"/>
-              <a:t>Methodology</a:t>
-            </a:r>
-            <a:endParaRPr lang="en-US" dirty="0"/>
+              <a:rPr lang="en-US" b="1" dirty="0">
+                <a:effectLst/>
+              </a:rPr>
+              <a:t>Data Analysis</a:t>
+            </a:r>
+            <a:endParaRPr lang="en-US" b="1" dirty="0"/>
           </a:p>
         </p:txBody>
       </p:sp>
@@ -6181,102 +6120,64 @@
             <p:ph idx="1"/>
           </p:nvPr>
         </p:nvSpPr>
-        <p:spPr>
-          <a:xfrm>
-            <a:off x="1141413" y="2666999"/>
-            <a:ext cx="9905998" cy="3968932"/>
-          </a:xfrm>
-        </p:spPr>
-        <p:txBody>
-          <a:bodyPr>
-            <a:normAutofit/>
-          </a:bodyPr>
+        <p:spPr/>
+        <p:txBody>
+          <a:bodyPr/>
           <a:lstStyle/>
           <a:p>
             <a:r>
               <a:rPr lang="en-US" dirty="0"/>
-              <a:t>Categorized the </a:t>
+              <a:t>Part 3: </a:t>
+            </a:r>
+            <a:endParaRPr lang="en-US" dirty="0" smtClean="0"/>
+          </a:p>
+          <a:p>
+            <a:pPr lvl="1"/>
+            <a:r>
+              <a:rPr lang="en-US" dirty="0" smtClean="0"/>
+              <a:t>Creating </a:t>
+            </a:r>
+            <a:r>
+              <a:rPr lang="en-US" dirty="0"/>
+              <a:t>a new consolidated dataset of the Neighborhoods, along with their boroughs, crime data and the respective </a:t>
             </a:r>
             <a:r>
               <a:rPr lang="en-US" dirty="0" err="1"/>
-              <a:t>methodologysection</a:t>
+              <a:t>Neighbourhood's</a:t>
             </a:r>
             <a:r>
               <a:rPr lang="en-US" dirty="0"/>
-              <a:t> into two parts:</a:t>
-            </a:r>
-          </a:p>
-          <a:p>
-            <a:pPr lvl="1"/>
-            <a:r>
-              <a:rPr lang="en-US" b="1" dirty="0">
-                <a:hlinkClick r:id="rId2"/>
-              </a:rPr>
-              <a:t>Exploratory Data Analysis</a:t>
-            </a:r>
-            <a:r>
-              <a:rPr lang="en-US" dirty="0">
-                <a:hlinkClick r:id="rId2"/>
-              </a:rPr>
-              <a:t>:</a:t>
-            </a:r>
+              <a:t> co-ordinates.:</a:t>
+            </a:r>
+          </a:p>
+          <a:p>
             <a:r>
               <a:rPr lang="en-US" dirty="0"/>
-              <a:t> </a:t>
+              <a:t>This data will be fetched using </a:t>
             </a:r>
             <a:r>
               <a:rPr lang="en-US" dirty="0" err="1"/>
-              <a:t>Visualise</a:t>
+              <a:t>OpenCage</a:t>
             </a:r>
             <a:r>
               <a:rPr lang="en-US" dirty="0"/>
-              <a:t> the crime repots in different Vancouver boroughs to </a:t>
+              <a:t> Geocoder to find the safest borough and explore the </a:t>
             </a:r>
             <a:r>
               <a:rPr lang="en-US" dirty="0" err="1"/>
-              <a:t>idenity</a:t>
+              <a:t>neighbourhood</a:t>
             </a:r>
             <a:r>
               <a:rPr lang="en-US" dirty="0"/>
-              <a:t> the safest borough and </a:t>
-            </a:r>
-            <a:r>
-              <a:rPr lang="en-US" dirty="0" err="1"/>
-              <a:t>normalise</a:t>
-            </a:r>
-            <a:r>
-              <a:rPr lang="en-US" dirty="0"/>
-              <a:t> the neighborhoods of that borough. We will Use the resulting data and find 10 most common venues in each neighborhood.</a:t>
-            </a:r>
-          </a:p>
-          <a:p>
-            <a:pPr lvl="1"/>
-            <a:r>
-              <a:rPr lang="en-US" b="1" dirty="0">
-                <a:hlinkClick r:id="rId3"/>
-              </a:rPr>
-              <a:t>Modelling</a:t>
-            </a:r>
-            <a:r>
-              <a:rPr lang="en-US" dirty="0">
-                <a:hlinkClick r:id="rId3"/>
-              </a:rPr>
-              <a:t>:</a:t>
-            </a:r>
-            <a:r>
-              <a:rPr lang="en-US" dirty="0"/>
-              <a:t> To help stakeholders choose the right neighborhood within a borough we will be clustering similar neighborhoods using K - means clustering which is a form of unsupervised machine learning algorithm that clusters data based on predefined cluster size. We will use K-Means clustering to address this problem so as to group data based on existing venues which will help in the decision making process.</a:t>
-            </a:r>
-          </a:p>
-          <a:p>
-            <a:endParaRPr lang="en-US" dirty="0"/>
+              <a:t> by plotting it on maps using Folium and perform exploratory data analysis.</a:t>
+            </a:r>
           </a:p>
         </p:txBody>
       </p:sp>
     </p:spTree>
     <p:extLst>
       <p:ext uri="{BB962C8B-B14F-4D97-AF65-F5344CB8AC3E}">
-        <p14:creationId xmlns:p14="http://schemas.microsoft.com/office/powerpoint/2010/main" val="2177422043"/>
+        <p14:creationId xmlns:p14="http://schemas.microsoft.com/office/powerpoint/2010/main" val="918173466"/>
       </p:ext>
     </p:extLst>
   </p:cSld>
@@ -6326,10 +6227,17 @@
           <a:lstStyle/>
           <a:p>
             <a:r>
-              <a:rPr lang="en-US" b="1" dirty="0"/>
-              <a:t>Results and Discussion </a:t>
-            </a:r>
-            <a:endParaRPr lang="en-US" dirty="0"/>
+              <a:rPr lang="en-US" dirty="0" smtClean="0"/>
+              <a:t>fetched Longitude, latitude </a:t>
+            </a:r>
+            <a:r>
+              <a:rPr lang="en-US" dirty="0" err="1"/>
+              <a:t>OpenCage</a:t>
+            </a:r>
+            <a:r>
+              <a:rPr lang="en-US" dirty="0"/>
+              <a:t> Geocoder</a:t>
+            </a:r>
           </a:p>
         </p:txBody>
       </p:sp>
@@ -6346,55 +6254,123 @@
         <p:spPr>
           <a:xfrm>
             <a:off x="1141413" y="2666999"/>
-            <a:ext cx="9905998" cy="3916681"/>
+            <a:ext cx="9905998" cy="690155"/>
           </a:xfrm>
         </p:spPr>
         <p:txBody>
-          <a:bodyPr>
-            <a:normAutofit/>
-          </a:bodyPr>
-          <a:lstStyle/>
-          <a:p>
+          <a:bodyPr/>
+          <a:lstStyle/>
+          <a:p>
+            <a:r>
+              <a:rPr lang="en-US" dirty="0" smtClean="0"/>
+              <a:t>By fetching long, </a:t>
+            </a:r>
+            <a:r>
+              <a:rPr lang="en-US" dirty="0" err="1" smtClean="0"/>
+              <a:t>lat</a:t>
+            </a:r>
+            <a:r>
+              <a:rPr lang="en-US" dirty="0" smtClean="0"/>
+              <a:t> </a:t>
+            </a:r>
+            <a:r>
+              <a:rPr lang="en-US" dirty="0" err="1" smtClean="0"/>
+              <a:t>tuide</a:t>
+            </a:r>
+            <a:r>
+              <a:rPr lang="en-US" dirty="0" smtClean="0"/>
+              <a:t> of </a:t>
+            </a:r>
             <a:r>
               <a:rPr lang="en-US" dirty="0"/>
-              <a:t>The objective of the business problem was to help stakeholders identify one of the safest borough in Vancouver, and an appropriate neighborhood within the borough to set up a commercial establishment especially a Grocery store. This has been achieved by first making use of Vancouver crime data to identify a safe </a:t>
-            </a:r>
-            <a:r>
-              <a:rPr lang="en-US" dirty="0" err="1"/>
-              <a:t>borugh</a:t>
-            </a:r>
-            <a:r>
-              <a:rPr lang="en-US" dirty="0"/>
-              <a:t> with considerable number of neighborhood for any business to be viable. After selecting the borough it was imperative to choose the right neighborhood where grocery shops were not among venues in a close proximity to each other. We achieved this by grouping the neighborhoods into clusters to assist the stakeholders by providing them with </a:t>
-            </a:r>
-            <a:r>
-              <a:rPr lang="en-US" dirty="0" err="1"/>
-              <a:t>relavent</a:t>
-            </a:r>
-            <a:r>
-              <a:rPr lang="en-US" dirty="0"/>
-              <a:t> data about venues and safety of a given neighborhood.</a:t>
-            </a:r>
-          </a:p>
-        </p:txBody>
-      </p:sp>
+              <a:t>West Side </a:t>
+            </a:r>
+            <a:r>
+              <a:rPr lang="en-US" dirty="0" smtClean="0"/>
+              <a:t> </a:t>
+            </a:r>
+            <a:r>
+              <a:rPr lang="en-US" dirty="0" err="1" smtClean="0"/>
+              <a:t>Neighbourhood</a:t>
+            </a:r>
+            <a:r>
+              <a:rPr lang="en-US" dirty="0" smtClean="0"/>
+              <a:t> and Map them </a:t>
+            </a:r>
+            <a:endParaRPr lang="en-US" dirty="0"/>
+          </a:p>
+        </p:txBody>
+      </p:sp>
+      <p:pic>
+        <p:nvPicPr>
+          <p:cNvPr id="4" name="Picture 3"/>
+          <p:cNvPicPr>
+            <a:picLocks noChangeAspect="1"/>
+          </p:cNvPicPr>
+          <p:nvPr/>
+        </p:nvPicPr>
+        <p:blipFill>
+          <a:blip r:embed="rId2">
+            <a:extLst>
+              <a:ext uri="{28A0092B-C50C-407E-A947-70E740481C1C}">
+                <a14:useLocalDpi xmlns:a14="http://schemas.microsoft.com/office/drawing/2010/main" val="0"/>
+              </a:ext>
+            </a:extLst>
+          </a:blip>
+          <a:stretch>
+            <a:fillRect/>
+          </a:stretch>
+        </p:blipFill>
+        <p:spPr>
+          <a:xfrm>
+            <a:off x="1141413" y="3509553"/>
+            <a:ext cx="3038475" cy="3037658"/>
+          </a:xfrm>
+          <a:prstGeom prst="rect">
+            <a:avLst/>
+          </a:prstGeom>
+        </p:spPr>
+      </p:pic>
+      <p:pic>
+        <p:nvPicPr>
+          <p:cNvPr id="5" name="Picture 4"/>
+          <p:cNvPicPr>
+            <a:picLocks noChangeAspect="1"/>
+          </p:cNvPicPr>
+          <p:nvPr/>
+        </p:nvPicPr>
+        <p:blipFill>
+          <a:blip r:embed="rId3">
+            <a:extLst>
+              <a:ext uri="{28A0092B-C50C-407E-A947-70E740481C1C}">
+                <a14:useLocalDpi xmlns:a14="http://schemas.microsoft.com/office/drawing/2010/main" val="0"/>
+              </a:ext>
+            </a:extLst>
+          </a:blip>
+          <a:stretch>
+            <a:fillRect/>
+          </a:stretch>
+        </p:blipFill>
+        <p:spPr>
+          <a:xfrm>
+            <a:off x="4833257" y="3509553"/>
+            <a:ext cx="6394903" cy="3037658"/>
+          </a:xfrm>
+          <a:prstGeom prst="rect">
+            <a:avLst/>
+          </a:prstGeom>
+        </p:spPr>
+      </p:pic>
     </p:spTree>
     <p:extLst>
       <p:ext uri="{BB962C8B-B14F-4D97-AF65-F5344CB8AC3E}">
-        <p14:creationId xmlns:p14="http://schemas.microsoft.com/office/powerpoint/2010/main" val="1619347195"/>
+        <p14:creationId xmlns:p14="http://schemas.microsoft.com/office/powerpoint/2010/main" val="2069357466"/>
       </p:ext>
     </p:extLst>
   </p:cSld>
   <p:clrMapOvr>
     <a:masterClrMapping/>
   </p:clrMapOvr>
-  <p:timing>
-    <p:tnLst>
-      <p:par>
-        <p:cTn id="1" dur="indefinite" restart="never" nodeType="tmRoot"/>
-      </p:par>
-    </p:tnLst>
-  </p:timing>
 </p:sld>
 </file>
 
@@ -6431,10 +6407,12 @@
           <a:lstStyle/>
           <a:p>
             <a:r>
-              <a:rPr lang="en-US" b="1" dirty="0"/>
-              <a:t>Conclusion </a:t>
-            </a:r>
-            <a:endParaRPr lang="en-US" dirty="0"/>
+              <a:rPr lang="en-US" b="1" dirty="0">
+                <a:effectLst/>
+              </a:rPr>
+              <a:t>Data Analysis</a:t>
+            </a:r>
+            <a:endParaRPr lang="en-US" b="1" dirty="0"/>
           </a:p>
         </p:txBody>
       </p:sp>
@@ -6454,12 +6432,50 @@
           <a:lstStyle/>
           <a:p>
             <a:r>
+              <a:rPr lang="en-US" dirty="0"/>
+              <a:t>Part 4: </a:t>
+            </a:r>
+            <a:endParaRPr lang="en-US" dirty="0" smtClean="0"/>
+          </a:p>
+          <a:p>
+            <a:pPr lvl="1"/>
+            <a:r>
               <a:rPr lang="en-US" dirty="0" smtClean="0"/>
-              <a:t>explored </a:t>
+              <a:t>Creating </a:t>
             </a:r>
             <a:r>
               <a:rPr lang="en-US" dirty="0"/>
-              <a:t>the crime data to understand different types of crimes in all neighborhoods of Vancouver and later categorized them into different boroughs, this helped us group the neighborhoods into boroughs and choose the safest borough first. Once we confirmed the borough the number of neighborhoods for consideration also comes down, we further shortlist the neighborhoods based on the common venues, to choose a neighborhood which best suits the business problem.</a:t>
+              <a:t>a new consolidated dataset of the Neighborhoods, boroughs, and the most common venues and the respective </a:t>
+            </a:r>
+            <a:r>
+              <a:rPr lang="en-US" dirty="0" err="1"/>
+              <a:t>Neighbourhood</a:t>
+            </a:r>
+            <a:r>
+              <a:rPr lang="en-US" dirty="0"/>
+              <a:t> along with co-ordinates.:</a:t>
+            </a:r>
+          </a:p>
+          <a:p>
+            <a:r>
+              <a:rPr lang="en-US" dirty="0"/>
+              <a:t>This data will be fetched using Four Square API to explore the </a:t>
+            </a:r>
+            <a:r>
+              <a:rPr lang="en-US" dirty="0" err="1"/>
+              <a:t>neighbourhood</a:t>
+            </a:r>
+            <a:r>
+              <a:rPr lang="en-US" dirty="0"/>
+              <a:t> venues and to apply machine learning algorithm to cluster the </a:t>
+            </a:r>
+            <a:r>
+              <a:rPr lang="en-US" dirty="0" err="1"/>
+              <a:t>neighbourhoods</a:t>
+            </a:r>
+            <a:r>
+              <a:rPr lang="en-US" dirty="0"/>
+              <a:t> and present the findings by plotting it on maps using Folium.</a:t>
             </a:r>
           </a:p>
         </p:txBody>
@@ -6467,7 +6483,622 @@
     </p:spTree>
     <p:extLst>
       <p:ext uri="{BB962C8B-B14F-4D97-AF65-F5344CB8AC3E}">
-        <p14:creationId xmlns:p14="http://schemas.microsoft.com/office/powerpoint/2010/main" val="3137965926"/>
+        <p14:creationId xmlns:p14="http://schemas.microsoft.com/office/powerpoint/2010/main" val="3658460567"/>
+      </p:ext>
+    </p:extLst>
+  </p:cSld>
+  <p:clrMapOvr>
+    <a:masterClrMapping/>
+  </p:clrMapOvr>
+  <p:timing>
+    <p:tnLst>
+      <p:par>
+        <p:cTn id="1" dur="indefinite" restart="never" nodeType="tmRoot"/>
+      </p:par>
+    </p:tnLst>
+  </p:timing>
+</p:sld>
+</file>
+
+<file path=ppt/slides/slide15.xml><?xml version="1.0" encoding="utf-8"?>
+<p:sld xmlns:a="http://schemas.openxmlformats.org/drawingml/2006/main" xmlns:r="http://schemas.openxmlformats.org/officeDocument/2006/relationships" xmlns:p="http://schemas.openxmlformats.org/presentationml/2006/main">
+  <p:cSld>
+    <p:spTree>
+      <p:nvGrpSpPr>
+        <p:cNvPr id="1" name=""/>
+        <p:cNvGrpSpPr/>
+        <p:nvPr/>
+      </p:nvGrpSpPr>
+      <p:grpSpPr>
+        <a:xfrm>
+          <a:off x="0" y="0"/>
+          <a:ext cx="0" cy="0"/>
+          <a:chOff x="0" y="0"/>
+          <a:chExt cx="0" cy="0"/>
+        </a:xfrm>
+      </p:grpSpPr>
+      <p:sp>
+        <p:nvSpPr>
+          <p:cNvPr id="2" name="Title 1"/>
+          <p:cNvSpPr>
+            <a:spLocks noGrp="1"/>
+          </p:cNvSpPr>
+          <p:nvPr>
+            <p:ph type="title"/>
+          </p:nvPr>
+        </p:nvSpPr>
+        <p:spPr/>
+        <p:txBody>
+          <a:bodyPr/>
+          <a:lstStyle/>
+          <a:p>
+            <a:r>
+              <a:rPr lang="en-US" dirty="0" smtClean="0"/>
+              <a:t>the </a:t>
+            </a:r>
+            <a:r>
+              <a:rPr lang="en-US" dirty="0"/>
+              <a:t>most common venues and the respective </a:t>
+            </a:r>
+            <a:r>
+              <a:rPr lang="en-US" dirty="0" err="1"/>
+              <a:t>Neighbourhood</a:t>
+            </a:r>
+            <a:endParaRPr lang="en-US" dirty="0"/>
+          </a:p>
+        </p:txBody>
+      </p:sp>
+      <p:pic>
+        <p:nvPicPr>
+          <p:cNvPr id="4" name="Content Placeholder 3"/>
+          <p:cNvPicPr>
+            <a:picLocks noGrp="1" noChangeAspect="1"/>
+          </p:cNvPicPr>
+          <p:nvPr>
+            <p:ph idx="1"/>
+          </p:nvPr>
+        </p:nvPicPr>
+        <p:blipFill>
+          <a:blip r:embed="rId2">
+            <a:extLst>
+              <a:ext uri="{28A0092B-C50C-407E-A947-70E740481C1C}">
+                <a14:useLocalDpi xmlns:a14="http://schemas.microsoft.com/office/drawing/2010/main" val="0"/>
+              </a:ext>
+            </a:extLst>
+          </a:blip>
+          <a:stretch>
+            <a:fillRect/>
+          </a:stretch>
+        </p:blipFill>
+        <p:spPr>
+          <a:xfrm>
+            <a:off x="1141413" y="2514600"/>
+            <a:ext cx="9905998" cy="3716383"/>
+          </a:xfrm>
+        </p:spPr>
+      </p:pic>
+    </p:spTree>
+    <p:extLst>
+      <p:ext uri="{BB962C8B-B14F-4D97-AF65-F5344CB8AC3E}">
+        <p14:creationId xmlns:p14="http://schemas.microsoft.com/office/powerpoint/2010/main" val="2083294336"/>
+      </p:ext>
+    </p:extLst>
+  </p:cSld>
+  <p:clrMapOvr>
+    <a:masterClrMapping/>
+  </p:clrMapOvr>
+</p:sld>
+</file>
+
+<file path=ppt/slides/slide16.xml><?xml version="1.0" encoding="utf-8"?>
+<p:sld xmlns:a="http://schemas.openxmlformats.org/drawingml/2006/main" xmlns:r="http://schemas.openxmlformats.org/officeDocument/2006/relationships" xmlns:p="http://schemas.openxmlformats.org/presentationml/2006/main">
+  <p:cSld>
+    <p:spTree>
+      <p:nvGrpSpPr>
+        <p:cNvPr id="1" name=""/>
+        <p:cNvGrpSpPr/>
+        <p:nvPr/>
+      </p:nvGrpSpPr>
+      <p:grpSpPr>
+        <a:xfrm>
+          <a:off x="0" y="0"/>
+          <a:ext cx="0" cy="0"/>
+          <a:chOff x="0" y="0"/>
+          <a:chExt cx="0" cy="0"/>
+        </a:xfrm>
+      </p:grpSpPr>
+      <p:sp>
+        <p:nvSpPr>
+          <p:cNvPr id="2" name="Title 1"/>
+          <p:cNvSpPr>
+            <a:spLocks noGrp="1"/>
+          </p:cNvSpPr>
+          <p:nvPr>
+            <p:ph type="title"/>
+          </p:nvPr>
+        </p:nvSpPr>
+        <p:spPr/>
+        <p:txBody>
+          <a:bodyPr/>
+          <a:lstStyle/>
+          <a:p>
+            <a:r>
+              <a:rPr lang="en-US" b="1" dirty="0">
+                <a:effectLst/>
+              </a:rPr>
+              <a:t>Importing </a:t>
+            </a:r>
+            <a:r>
+              <a:rPr lang="en-US" b="1" dirty="0" smtClean="0">
+                <a:effectLst/>
+              </a:rPr>
+              <a:t>Libraries</a:t>
+            </a:r>
+            <a:endParaRPr lang="en-US" b="1" dirty="0"/>
+          </a:p>
+        </p:txBody>
+      </p:sp>
+      <p:sp>
+        <p:nvSpPr>
+          <p:cNvPr id="3" name="Content Placeholder 2"/>
+          <p:cNvSpPr>
+            <a:spLocks noGrp="1"/>
+          </p:cNvSpPr>
+          <p:nvPr>
+            <p:ph idx="1"/>
+          </p:nvPr>
+        </p:nvSpPr>
+        <p:spPr>
+          <a:xfrm>
+            <a:off x="1141413" y="2666999"/>
+            <a:ext cx="9905998" cy="3893821"/>
+          </a:xfrm>
+        </p:spPr>
+        <p:txBody>
+          <a:bodyPr>
+            <a:normAutofit/>
+          </a:bodyPr>
+          <a:lstStyle/>
+          <a:p>
+            <a:r>
+              <a:rPr lang="en-US" dirty="0" err="1">
+                <a:effectLst/>
+              </a:rPr>
+              <a:t>numpy</a:t>
+            </a:r>
+            <a:endParaRPr lang="en-US" dirty="0">
+              <a:effectLst/>
+            </a:endParaRPr>
+          </a:p>
+          <a:p>
+            <a:r>
+              <a:rPr lang="en-US" dirty="0">
+                <a:effectLst/>
+              </a:rPr>
+              <a:t>pandas</a:t>
+            </a:r>
+          </a:p>
+          <a:p>
+            <a:r>
+              <a:rPr lang="en-US" dirty="0" err="1">
+                <a:effectLst/>
+              </a:rPr>
+              <a:t>opencage</a:t>
+            </a:r>
+            <a:endParaRPr lang="en-US" dirty="0">
+              <a:effectLst/>
+            </a:endParaRPr>
+          </a:p>
+          <a:p>
+            <a:r>
+              <a:rPr lang="en-US" dirty="0" err="1">
+                <a:effectLst/>
+              </a:rPr>
+              <a:t>matplotlib</a:t>
+            </a:r>
+            <a:endParaRPr lang="en-US" dirty="0">
+              <a:effectLst/>
+            </a:endParaRPr>
+          </a:p>
+          <a:p>
+            <a:r>
+              <a:rPr lang="en-US" dirty="0">
+                <a:effectLst/>
+              </a:rPr>
+              <a:t>folium</a:t>
+            </a:r>
+          </a:p>
+          <a:p>
+            <a:r>
+              <a:rPr lang="en-US" dirty="0">
+                <a:effectLst/>
+              </a:rPr>
+              <a:t>requests</a:t>
+            </a:r>
+          </a:p>
+          <a:p>
+            <a:r>
+              <a:rPr lang="en-US" dirty="0" smtClean="0">
+                <a:effectLst/>
+              </a:rPr>
+              <a:t>pandas.io</a:t>
+            </a:r>
+            <a:endParaRPr lang="en-US" dirty="0">
+              <a:effectLst/>
+            </a:endParaRPr>
+          </a:p>
+          <a:p>
+            <a:r>
+              <a:rPr lang="en-US" dirty="0" err="1">
+                <a:effectLst/>
+              </a:rPr>
+              <a:t>sklearn</a:t>
+            </a:r>
+            <a:endParaRPr lang="en-US" dirty="0">
+              <a:effectLst/>
+            </a:endParaRPr>
+          </a:p>
+          <a:p>
+            <a:endParaRPr lang="en-US" dirty="0"/>
+          </a:p>
+        </p:txBody>
+      </p:sp>
+    </p:spTree>
+    <p:extLst>
+      <p:ext uri="{BB962C8B-B14F-4D97-AF65-F5344CB8AC3E}">
+        <p14:creationId xmlns:p14="http://schemas.microsoft.com/office/powerpoint/2010/main" val="3141356143"/>
+      </p:ext>
+    </p:extLst>
+  </p:cSld>
+  <p:clrMapOvr>
+    <a:masterClrMapping/>
+  </p:clrMapOvr>
+  <p:timing>
+    <p:tnLst>
+      <p:par>
+        <p:cTn id="1" dur="indefinite" restart="never" nodeType="tmRoot"/>
+      </p:par>
+    </p:tnLst>
+  </p:timing>
+</p:sld>
+</file>
+
+<file path=ppt/slides/slide17.xml><?xml version="1.0" encoding="utf-8"?>
+<p:sld xmlns:a="http://schemas.openxmlformats.org/drawingml/2006/main" xmlns:r="http://schemas.openxmlformats.org/officeDocument/2006/relationships" xmlns:p="http://schemas.openxmlformats.org/presentationml/2006/main">
+  <p:cSld>
+    <p:spTree>
+      <p:nvGrpSpPr>
+        <p:cNvPr id="1" name=""/>
+        <p:cNvGrpSpPr/>
+        <p:nvPr/>
+      </p:nvGrpSpPr>
+      <p:grpSpPr>
+        <a:xfrm>
+          <a:off x="0" y="0"/>
+          <a:ext cx="0" cy="0"/>
+          <a:chOff x="0" y="0"/>
+          <a:chExt cx="0" cy="0"/>
+        </a:xfrm>
+      </p:grpSpPr>
+      <p:sp>
+        <p:nvSpPr>
+          <p:cNvPr id="2" name="Title 1"/>
+          <p:cNvSpPr>
+            <a:spLocks noGrp="1"/>
+          </p:cNvSpPr>
+          <p:nvPr>
+            <p:ph type="title"/>
+          </p:nvPr>
+        </p:nvSpPr>
+        <p:spPr/>
+        <p:txBody>
+          <a:bodyPr/>
+          <a:lstStyle/>
+          <a:p>
+            <a:r>
+              <a:rPr lang="en-US" b="1" dirty="0" smtClean="0"/>
+              <a:t>Methodology</a:t>
+            </a:r>
+            <a:endParaRPr lang="en-US" dirty="0"/>
+          </a:p>
+        </p:txBody>
+      </p:sp>
+      <p:sp>
+        <p:nvSpPr>
+          <p:cNvPr id="3" name="Content Placeholder 2"/>
+          <p:cNvSpPr>
+            <a:spLocks noGrp="1"/>
+          </p:cNvSpPr>
+          <p:nvPr>
+            <p:ph idx="1"/>
+          </p:nvPr>
+        </p:nvSpPr>
+        <p:spPr>
+          <a:xfrm>
+            <a:off x="1141413" y="2666999"/>
+            <a:ext cx="9905998" cy="3968932"/>
+          </a:xfrm>
+        </p:spPr>
+        <p:txBody>
+          <a:bodyPr>
+            <a:normAutofit/>
+          </a:bodyPr>
+          <a:lstStyle/>
+          <a:p>
+            <a:r>
+              <a:rPr lang="en-US" dirty="0"/>
+              <a:t>Categorized the </a:t>
+            </a:r>
+            <a:r>
+              <a:rPr lang="en-US" dirty="0" err="1"/>
+              <a:t>methodologysection</a:t>
+            </a:r>
+            <a:r>
+              <a:rPr lang="en-US" dirty="0"/>
+              <a:t> into two parts:</a:t>
+            </a:r>
+          </a:p>
+          <a:p>
+            <a:pPr lvl="1"/>
+            <a:r>
+              <a:rPr lang="en-US" b="1" dirty="0">
+                <a:hlinkClick r:id="rId2"/>
+              </a:rPr>
+              <a:t>Exploratory Data Analysis</a:t>
+            </a:r>
+            <a:r>
+              <a:rPr lang="en-US" dirty="0">
+                <a:hlinkClick r:id="rId2"/>
+              </a:rPr>
+              <a:t>:</a:t>
+            </a:r>
+            <a:r>
+              <a:rPr lang="en-US" dirty="0"/>
+              <a:t> </a:t>
+            </a:r>
+            <a:r>
+              <a:rPr lang="en-US" dirty="0" err="1"/>
+              <a:t>Visualise</a:t>
+            </a:r>
+            <a:r>
+              <a:rPr lang="en-US" dirty="0"/>
+              <a:t> the crime repots in different Vancouver boroughs to </a:t>
+            </a:r>
+            <a:r>
+              <a:rPr lang="en-US" dirty="0" err="1"/>
+              <a:t>idenity</a:t>
+            </a:r>
+            <a:r>
+              <a:rPr lang="en-US" dirty="0"/>
+              <a:t> the safest borough and </a:t>
+            </a:r>
+            <a:r>
+              <a:rPr lang="en-US" dirty="0" err="1"/>
+              <a:t>normalise</a:t>
+            </a:r>
+            <a:r>
+              <a:rPr lang="en-US" dirty="0"/>
+              <a:t> the neighborhoods of that borough. We will Use the resulting data and find 10 most common venues in each neighborhood.</a:t>
+            </a:r>
+          </a:p>
+          <a:p>
+            <a:pPr lvl="1"/>
+            <a:r>
+              <a:rPr lang="en-US" b="1" dirty="0">
+                <a:hlinkClick r:id="rId3"/>
+              </a:rPr>
+              <a:t>Modelling</a:t>
+            </a:r>
+            <a:r>
+              <a:rPr lang="en-US" dirty="0">
+                <a:hlinkClick r:id="rId3"/>
+              </a:rPr>
+              <a:t>:</a:t>
+            </a:r>
+            <a:r>
+              <a:rPr lang="en-US" dirty="0"/>
+              <a:t> To help stakeholders choose the right neighborhood within a borough we will be clustering similar neighborhoods using K - means clustering which is a form of unsupervised machine learning algorithm that clusters data based on predefined cluster size. We will use K-Means clustering to address this problem so as to group data based on existing venues which will help in the decision making process.</a:t>
+            </a:r>
+          </a:p>
+          <a:p>
+            <a:endParaRPr lang="en-US" dirty="0"/>
+          </a:p>
+        </p:txBody>
+      </p:sp>
+    </p:spTree>
+    <p:extLst>
+      <p:ext uri="{BB962C8B-B14F-4D97-AF65-F5344CB8AC3E}">
+        <p14:creationId xmlns:p14="http://schemas.microsoft.com/office/powerpoint/2010/main" val="2177422043"/>
+      </p:ext>
+    </p:extLst>
+  </p:cSld>
+  <p:clrMapOvr>
+    <a:masterClrMapping/>
+  </p:clrMapOvr>
+  <p:timing>
+    <p:tnLst>
+      <p:par>
+        <p:cTn id="1" dur="indefinite" restart="never" nodeType="tmRoot"/>
+      </p:par>
+    </p:tnLst>
+  </p:timing>
+</p:sld>
+</file>
+
+<file path=ppt/slides/slide18.xml><?xml version="1.0" encoding="utf-8"?>
+<p:sld xmlns:a="http://schemas.openxmlformats.org/drawingml/2006/main" xmlns:r="http://schemas.openxmlformats.org/officeDocument/2006/relationships" xmlns:p="http://schemas.openxmlformats.org/presentationml/2006/main">
+  <p:cSld>
+    <p:spTree>
+      <p:nvGrpSpPr>
+        <p:cNvPr id="1" name=""/>
+        <p:cNvGrpSpPr/>
+        <p:nvPr/>
+      </p:nvGrpSpPr>
+      <p:grpSpPr>
+        <a:xfrm>
+          <a:off x="0" y="0"/>
+          <a:ext cx="0" cy="0"/>
+          <a:chOff x="0" y="0"/>
+          <a:chExt cx="0" cy="0"/>
+        </a:xfrm>
+      </p:grpSpPr>
+      <p:sp>
+        <p:nvSpPr>
+          <p:cNvPr id="2" name="Title 1"/>
+          <p:cNvSpPr>
+            <a:spLocks noGrp="1"/>
+          </p:cNvSpPr>
+          <p:nvPr>
+            <p:ph type="title"/>
+          </p:nvPr>
+        </p:nvSpPr>
+        <p:spPr/>
+        <p:txBody>
+          <a:bodyPr/>
+          <a:lstStyle/>
+          <a:p>
+            <a:r>
+              <a:rPr lang="en-US" b="1" dirty="0"/>
+              <a:t>One Hot Encoding to Analyze Each Neighborhood</a:t>
+            </a:r>
+            <a:br>
+              <a:rPr lang="en-US" b="1" dirty="0"/>
+            </a:br>
+            <a:endParaRPr lang="en-US" dirty="0"/>
+          </a:p>
+        </p:txBody>
+      </p:sp>
+      <p:pic>
+        <p:nvPicPr>
+          <p:cNvPr id="4" name="Content Placeholder 3"/>
+          <p:cNvPicPr>
+            <a:picLocks noGrp="1" noChangeAspect="1"/>
+          </p:cNvPicPr>
+          <p:nvPr>
+            <p:ph idx="1"/>
+          </p:nvPr>
+        </p:nvPicPr>
+        <p:blipFill>
+          <a:blip r:embed="rId2">
+            <a:extLst>
+              <a:ext uri="{28A0092B-C50C-407E-A947-70E740481C1C}">
+                <a14:useLocalDpi xmlns:a14="http://schemas.microsoft.com/office/drawing/2010/main" val="0"/>
+              </a:ext>
+            </a:extLst>
+          </a:blip>
+          <a:stretch>
+            <a:fillRect/>
+          </a:stretch>
+        </p:blipFill>
+        <p:spPr>
+          <a:xfrm>
+            <a:off x="1141413" y="2129246"/>
+            <a:ext cx="9905998" cy="4480560"/>
+          </a:xfrm>
+        </p:spPr>
+      </p:pic>
+    </p:spTree>
+    <p:extLst>
+      <p:ext uri="{BB962C8B-B14F-4D97-AF65-F5344CB8AC3E}">
+        <p14:creationId xmlns:p14="http://schemas.microsoft.com/office/powerpoint/2010/main" val="2389301262"/>
+      </p:ext>
+    </p:extLst>
+  </p:cSld>
+  <p:clrMapOvr>
+    <a:masterClrMapping/>
+  </p:clrMapOvr>
+</p:sld>
+</file>
+
+<file path=ppt/slides/slide19.xml><?xml version="1.0" encoding="utf-8"?>
+<p:sld xmlns:a="http://schemas.openxmlformats.org/drawingml/2006/main" xmlns:r="http://schemas.openxmlformats.org/officeDocument/2006/relationships" xmlns:p="http://schemas.openxmlformats.org/presentationml/2006/main">
+  <p:cSld>
+    <p:spTree>
+      <p:nvGrpSpPr>
+        <p:cNvPr id="1" name=""/>
+        <p:cNvGrpSpPr/>
+        <p:nvPr/>
+      </p:nvGrpSpPr>
+      <p:grpSpPr>
+        <a:xfrm>
+          <a:off x="0" y="0"/>
+          <a:ext cx="0" cy="0"/>
+          <a:chOff x="0" y="0"/>
+          <a:chExt cx="0" cy="0"/>
+        </a:xfrm>
+      </p:grpSpPr>
+      <p:sp>
+        <p:nvSpPr>
+          <p:cNvPr id="2" name="Title 1"/>
+          <p:cNvSpPr>
+            <a:spLocks noGrp="1"/>
+          </p:cNvSpPr>
+          <p:nvPr>
+            <p:ph type="title"/>
+          </p:nvPr>
+        </p:nvSpPr>
+        <p:spPr/>
+        <p:txBody>
+          <a:bodyPr/>
+          <a:lstStyle/>
+          <a:p>
+            <a:r>
+              <a:rPr lang="en-US" b="1" dirty="0"/>
+              <a:t>Results and Discussion </a:t>
+            </a:r>
+            <a:endParaRPr lang="en-US" dirty="0"/>
+          </a:p>
+        </p:txBody>
+      </p:sp>
+      <p:sp>
+        <p:nvSpPr>
+          <p:cNvPr id="3" name="Content Placeholder 2"/>
+          <p:cNvSpPr>
+            <a:spLocks noGrp="1"/>
+          </p:cNvSpPr>
+          <p:nvPr>
+            <p:ph idx="1"/>
+          </p:nvPr>
+        </p:nvSpPr>
+        <p:spPr>
+          <a:xfrm>
+            <a:off x="1141413" y="2666999"/>
+            <a:ext cx="9905998" cy="3916681"/>
+          </a:xfrm>
+        </p:spPr>
+        <p:txBody>
+          <a:bodyPr>
+            <a:normAutofit/>
+          </a:bodyPr>
+          <a:lstStyle/>
+          <a:p>
+            <a:r>
+              <a:rPr lang="en-US" dirty="0"/>
+              <a:t>The objective of the business problem was to help stakeholders identify one of the safest borough in Vancouver, and an appropriate neighborhood within the borough to set up a commercial establishment especially a Grocery store. This has been achieved by first making use of Vancouver crime data to identify a safe </a:t>
+            </a:r>
+            <a:r>
+              <a:rPr lang="en-US" dirty="0" err="1"/>
+              <a:t>borugh</a:t>
+            </a:r>
+            <a:r>
+              <a:rPr lang="en-US" dirty="0"/>
+              <a:t> with considerable number of neighborhood for any business to be viable. After selecting the borough it was imperative to choose the right neighborhood where grocery shops were not among venues in a close proximity to each other. We achieved this by grouping the neighborhoods into clusters to assist the stakeholders by providing them with </a:t>
+            </a:r>
+            <a:r>
+              <a:rPr lang="en-US" dirty="0" err="1"/>
+              <a:t>relavent</a:t>
+            </a:r>
+            <a:r>
+              <a:rPr lang="en-US" dirty="0"/>
+              <a:t> data about venues and safety of a given neighborhood.</a:t>
+            </a:r>
+          </a:p>
+        </p:txBody>
+      </p:sp>
+    </p:spTree>
+    <p:extLst>
+      <p:ext uri="{BB962C8B-B14F-4D97-AF65-F5344CB8AC3E}">
+        <p14:creationId xmlns:p14="http://schemas.microsoft.com/office/powerpoint/2010/main" val="1619347195"/>
       </p:ext>
     </p:extLst>
   </p:cSld>
@@ -6604,6 +7235,213 @@
     <p:extLst>
       <p:ext uri="{BB962C8B-B14F-4D97-AF65-F5344CB8AC3E}">
         <p14:creationId xmlns:p14="http://schemas.microsoft.com/office/powerpoint/2010/main" val="3754096333"/>
+      </p:ext>
+    </p:extLst>
+  </p:cSld>
+  <p:clrMapOvr>
+    <a:masterClrMapping/>
+  </p:clrMapOvr>
+  <p:timing>
+    <p:tnLst>
+      <p:par>
+        <p:cTn id="1" dur="indefinite" restart="never" nodeType="tmRoot"/>
+      </p:par>
+    </p:tnLst>
+  </p:timing>
+</p:sld>
+</file>
+
+<file path=ppt/slides/slide20.xml><?xml version="1.0" encoding="utf-8"?>
+<p:sld xmlns:a="http://schemas.openxmlformats.org/drawingml/2006/main" xmlns:r="http://schemas.openxmlformats.org/officeDocument/2006/relationships" xmlns:p="http://schemas.openxmlformats.org/presentationml/2006/main">
+  <p:cSld>
+    <p:spTree>
+      <p:nvGrpSpPr>
+        <p:cNvPr id="1" name=""/>
+        <p:cNvGrpSpPr/>
+        <p:nvPr/>
+      </p:nvGrpSpPr>
+      <p:grpSpPr>
+        <a:xfrm>
+          <a:off x="0" y="0"/>
+          <a:ext cx="0" cy="0"/>
+          <a:chOff x="0" y="0"/>
+          <a:chExt cx="0" cy="0"/>
+        </a:xfrm>
+      </p:grpSpPr>
+      <p:sp>
+        <p:nvSpPr>
+          <p:cNvPr id="2" name="Title 1"/>
+          <p:cNvSpPr>
+            <a:spLocks noGrp="1"/>
+          </p:cNvSpPr>
+          <p:nvPr>
+            <p:ph type="title"/>
+          </p:nvPr>
+        </p:nvSpPr>
+        <p:spPr/>
+        <p:txBody>
+          <a:bodyPr/>
+          <a:lstStyle/>
+          <a:p>
+            <a:r>
+              <a:rPr lang="en-US" dirty="0" smtClean="0"/>
+              <a:t>5 Cluster of </a:t>
+            </a:r>
+            <a:r>
+              <a:rPr lang="en-US" dirty="0"/>
+              <a:t>safety </a:t>
+            </a:r>
+            <a:r>
+              <a:rPr lang="en-US" dirty="0" smtClean="0"/>
+              <a:t>in </a:t>
+            </a:r>
+            <a:r>
+              <a:rPr lang="en-US" dirty="0"/>
+              <a:t>West Side Borough</a:t>
+            </a:r>
+            <a:r>
+              <a:rPr lang="en-US" dirty="0" smtClean="0"/>
+              <a:t> </a:t>
+            </a:r>
+            <a:endParaRPr lang="en-US" dirty="0"/>
+          </a:p>
+        </p:txBody>
+      </p:sp>
+      <p:sp>
+        <p:nvSpPr>
+          <p:cNvPr id="5" name="Content Placeholder 4"/>
+          <p:cNvSpPr>
+            <a:spLocks noGrp="1"/>
+          </p:cNvSpPr>
+          <p:nvPr>
+            <p:ph idx="1"/>
+          </p:nvPr>
+        </p:nvSpPr>
+        <p:spPr>
+          <a:xfrm>
+            <a:off x="1141413" y="5997894"/>
+            <a:ext cx="9905998" cy="746895"/>
+          </a:xfrm>
+        </p:spPr>
+        <p:txBody>
+          <a:bodyPr/>
+          <a:lstStyle/>
+          <a:p>
+            <a:r>
+              <a:rPr lang="en-US" dirty="0" smtClean="0"/>
+              <a:t>Where Each Color Represent A cluster</a:t>
+            </a:r>
+            <a:endParaRPr lang="en-US" dirty="0"/>
+          </a:p>
+        </p:txBody>
+      </p:sp>
+      <p:pic>
+        <p:nvPicPr>
+          <p:cNvPr id="7" name="Picture 6"/>
+          <p:cNvPicPr>
+            <a:picLocks noChangeAspect="1"/>
+          </p:cNvPicPr>
+          <p:nvPr/>
+        </p:nvPicPr>
+        <p:blipFill>
+          <a:blip r:embed="rId2"/>
+          <a:stretch>
+            <a:fillRect/>
+          </a:stretch>
+        </p:blipFill>
+        <p:spPr>
+          <a:xfrm>
+            <a:off x="1141413" y="2035493"/>
+            <a:ext cx="9905998" cy="3620725"/>
+          </a:xfrm>
+          <a:prstGeom prst="rect">
+            <a:avLst/>
+          </a:prstGeom>
+        </p:spPr>
+      </p:pic>
+    </p:spTree>
+    <p:extLst>
+      <p:ext uri="{BB962C8B-B14F-4D97-AF65-F5344CB8AC3E}">
+        <p14:creationId xmlns:p14="http://schemas.microsoft.com/office/powerpoint/2010/main" val="1168018369"/>
+      </p:ext>
+    </p:extLst>
+  </p:cSld>
+  <p:clrMapOvr>
+    <a:masterClrMapping/>
+  </p:clrMapOvr>
+</p:sld>
+</file>
+
+<file path=ppt/slides/slide21.xml><?xml version="1.0" encoding="utf-8"?>
+<p:sld xmlns:a="http://schemas.openxmlformats.org/drawingml/2006/main" xmlns:r="http://schemas.openxmlformats.org/officeDocument/2006/relationships" xmlns:p="http://schemas.openxmlformats.org/presentationml/2006/main">
+  <p:cSld>
+    <p:spTree>
+      <p:nvGrpSpPr>
+        <p:cNvPr id="1" name=""/>
+        <p:cNvGrpSpPr/>
+        <p:nvPr/>
+      </p:nvGrpSpPr>
+      <p:grpSpPr>
+        <a:xfrm>
+          <a:off x="0" y="0"/>
+          <a:ext cx="0" cy="0"/>
+          <a:chOff x="0" y="0"/>
+          <a:chExt cx="0" cy="0"/>
+        </a:xfrm>
+      </p:grpSpPr>
+      <p:sp>
+        <p:nvSpPr>
+          <p:cNvPr id="2" name="Title 1"/>
+          <p:cNvSpPr>
+            <a:spLocks noGrp="1"/>
+          </p:cNvSpPr>
+          <p:nvPr>
+            <p:ph type="title"/>
+          </p:nvPr>
+        </p:nvSpPr>
+        <p:spPr/>
+        <p:txBody>
+          <a:bodyPr/>
+          <a:lstStyle/>
+          <a:p>
+            <a:r>
+              <a:rPr lang="en-US" b="1" dirty="0"/>
+              <a:t>Conclusion </a:t>
+            </a:r>
+            <a:endParaRPr lang="en-US" dirty="0"/>
+          </a:p>
+        </p:txBody>
+      </p:sp>
+      <p:sp>
+        <p:nvSpPr>
+          <p:cNvPr id="3" name="Content Placeholder 2"/>
+          <p:cNvSpPr>
+            <a:spLocks noGrp="1"/>
+          </p:cNvSpPr>
+          <p:nvPr>
+            <p:ph idx="1"/>
+          </p:nvPr>
+        </p:nvSpPr>
+        <p:spPr/>
+        <p:txBody>
+          <a:bodyPr/>
+          <a:lstStyle/>
+          <a:p>
+            <a:r>
+              <a:rPr lang="en-US" dirty="0" smtClean="0"/>
+              <a:t>explored </a:t>
+            </a:r>
+            <a:r>
+              <a:rPr lang="en-US" dirty="0"/>
+              <a:t>the crime data to understand different types of crimes in all neighborhoods of Vancouver and later categorized them into different boroughs, this helped us group the neighborhoods into boroughs and choose the safest borough first. Once we confirmed the borough the number of neighborhoods for consideration also comes down, we further shortlist the neighborhoods based on the common venues, to choose a neighborhood which best suits the business problem.</a:t>
+            </a:r>
+          </a:p>
+        </p:txBody>
+      </p:sp>
+    </p:spTree>
+    <p:extLst>
+      <p:ext uri="{BB962C8B-B14F-4D97-AF65-F5344CB8AC3E}">
+        <p14:creationId xmlns:p14="http://schemas.microsoft.com/office/powerpoint/2010/main" val="3137965926"/>
       </p:ext>
     </p:extLst>
   </p:cSld>
@@ -7527,12 +8365,14 @@
           <a:lstStyle/>
           <a:p>
             <a:r>
-              <a:rPr lang="en-US" b="1" dirty="0">
-                <a:effectLst/>
-              </a:rPr>
-              <a:t>Data Analysis</a:t>
-            </a:r>
-            <a:endParaRPr lang="en-US" b="1" dirty="0"/>
+              <a:rPr lang="en-US" b="1" dirty="0"/>
+              <a:t>Vancouver Crime </a:t>
+            </a:r>
+            <a:r>
+              <a:rPr lang="en-US" b="1" dirty="0" smtClean="0"/>
+              <a:t>Report</a:t>
+            </a:r>
+            <a:endParaRPr lang="en-US" dirty="0"/>
           </a:p>
         </p:txBody>
       </p:sp>
@@ -7546,42 +8386,51 @@
             <p:ph idx="1"/>
           </p:nvPr>
         </p:nvSpPr>
-        <p:spPr/>
+        <p:spPr>
+          <a:xfrm>
+            <a:off x="1141413" y="2286001"/>
+            <a:ext cx="6918370" cy="4232366"/>
+          </a:xfrm>
+        </p:spPr>
         <p:txBody>
           <a:bodyPr/>
           <a:lstStyle/>
           <a:p>
             <a:r>
-              <a:rPr lang="en-US" b="1" dirty="0"/>
-              <a:t>Part 2: </a:t>
-            </a:r>
-            <a:endParaRPr lang="en-US" b="1" dirty="0" smtClean="0"/>
-          </a:p>
-          <a:p>
-            <a:pPr lvl="1"/>
-            <a:r>
-              <a:rPr lang="en-US" b="1" dirty="0" smtClean="0"/>
-              <a:t>Gathering </a:t>
-            </a:r>
-            <a:r>
-              <a:rPr lang="en-US" b="1" dirty="0"/>
-              <a:t>additional information about the Neighborhood from Wikipedia</a:t>
-            </a:r>
-          </a:p>
-          <a:p>
-            <a:r>
-              <a:rPr lang="en-US" b="1" dirty="0"/>
-              <a:t>As part of data set Borough which the neighborhood was part of was not categorized, so we will create a dictionary of Neighborhood and based on data in the following </a:t>
-            </a:r>
-            <a:r>
-              <a:rPr lang="en-US" b="1" dirty="0">
-                <a:hlinkClick r:id="rId2"/>
-              </a:rPr>
-              <a:t>Wikipedia page</a:t>
-            </a:r>
-            <a:r>
-              <a:rPr lang="en-US" b="1" dirty="0"/>
-              <a:t>.</a:t>
+              <a:rPr lang="en-US" dirty="0"/>
+              <a:t>By Dropping (MINUTE', 'HUNDRED_BLOCK', 'X', </a:t>
+            </a:r>
+            <a:r>
+              <a:rPr lang="en-US" dirty="0" smtClean="0"/>
+              <a:t>'Y‘) Columns</a:t>
+            </a:r>
+          </a:p>
+          <a:p>
+            <a:r>
+              <a:rPr lang="en-US" dirty="0" smtClean="0"/>
+              <a:t>And focusing </a:t>
+            </a:r>
+            <a:r>
+              <a:rPr lang="en-US" dirty="0"/>
+              <a:t>On ('Type', 'Year','Month','Day','Hour',</a:t>
+            </a:r>
+            <a:r>
+              <a:rPr lang="en-US" dirty="0" smtClean="0"/>
+              <a:t>'</a:t>
+            </a:r>
+            <a:r>
+              <a:rPr lang="en-US" dirty="0" err="1" smtClean="0"/>
+              <a:t>Neighbourhood</a:t>
+            </a:r>
+            <a:r>
+              <a:rPr lang="en-US" dirty="0" smtClean="0"/>
+              <a:t>‘) Columns</a:t>
+            </a:r>
+          </a:p>
+          <a:p>
+            <a:r>
+              <a:rPr lang="en-US" dirty="0" smtClean="0"/>
+              <a:t>Getting the Count Values For Crimes </a:t>
             </a:r>
           </a:p>
           <a:p>
@@ -7589,23 +8438,46 @@
           </a:p>
         </p:txBody>
       </p:sp>
+      <p:pic>
+        <p:nvPicPr>
+          <p:cNvPr id="4" name="Picture 3"/>
+          <p:cNvPicPr>
+            <a:picLocks noChangeAspect="1"/>
+          </p:cNvPicPr>
+          <p:nvPr/>
+        </p:nvPicPr>
+        <p:blipFill>
+          <a:blip r:embed="rId2">
+            <a:extLst>
+              <a:ext uri="{28A0092B-C50C-407E-A947-70E740481C1C}">
+                <a14:useLocalDpi xmlns:a14="http://schemas.microsoft.com/office/drawing/2010/main" val="0"/>
+              </a:ext>
+            </a:extLst>
+          </a:blip>
+          <a:stretch>
+            <a:fillRect/>
+          </a:stretch>
+        </p:blipFill>
+        <p:spPr>
+          <a:xfrm>
+            <a:off x="8059783" y="2514600"/>
+            <a:ext cx="3526563" cy="4003766"/>
+          </a:xfrm>
+          <a:prstGeom prst="rect">
+            <a:avLst/>
+          </a:prstGeom>
+        </p:spPr>
+      </p:pic>
     </p:spTree>
     <p:extLst>
       <p:ext uri="{BB962C8B-B14F-4D97-AF65-F5344CB8AC3E}">
-        <p14:creationId xmlns:p14="http://schemas.microsoft.com/office/powerpoint/2010/main" val="1164860255"/>
+        <p14:creationId xmlns:p14="http://schemas.microsoft.com/office/powerpoint/2010/main" val="3636041169"/>
       </p:ext>
     </p:extLst>
   </p:cSld>
   <p:clrMapOvr>
     <a:masterClrMapping/>
   </p:clrMapOvr>
-  <p:timing>
-    <p:tnLst>
-      <p:par>
-        <p:cTn id="1" dur="indefinite" restart="never" nodeType="tmRoot"/>
-      </p:par>
-    </p:tnLst>
-  </p:timing>
 </p:sld>
 </file>
 
@@ -7667,58 +8539,47 @@
           <a:lstStyle/>
           <a:p>
             <a:r>
-              <a:rPr lang="en-US" dirty="0"/>
-              <a:t>Part 3: </a:t>
-            </a:r>
-            <a:endParaRPr lang="en-US" dirty="0" smtClean="0"/>
+              <a:rPr lang="en-US" b="1" dirty="0"/>
+              <a:t>Part 2: </a:t>
+            </a:r>
+            <a:endParaRPr lang="en-US" b="1" dirty="0" smtClean="0"/>
           </a:p>
           <a:p>
             <a:pPr lvl="1"/>
             <a:r>
-              <a:rPr lang="en-US" dirty="0" smtClean="0"/>
-              <a:t>Creating </a:t>
-            </a:r>
-            <a:r>
-              <a:rPr lang="en-US" dirty="0"/>
-              <a:t>a new consolidated dataset of the Neighborhoods, along with their boroughs, crime data and the respective </a:t>
-            </a:r>
-            <a:r>
-              <a:rPr lang="en-US" dirty="0" err="1"/>
-              <a:t>Neighbourhood's</a:t>
-            </a:r>
-            <a:r>
-              <a:rPr lang="en-US" dirty="0"/>
-              <a:t> co-ordinates.:</a:t>
-            </a:r>
-          </a:p>
-          <a:p>
-            <a:r>
-              <a:rPr lang="en-US" dirty="0"/>
-              <a:t>This data will be fetched using </a:t>
-            </a:r>
-            <a:r>
-              <a:rPr lang="en-US" dirty="0" err="1"/>
-              <a:t>OpenCage</a:t>
-            </a:r>
-            <a:r>
-              <a:rPr lang="en-US" dirty="0"/>
-              <a:t> Geocoder to find the safest borough and explore the </a:t>
-            </a:r>
-            <a:r>
-              <a:rPr lang="en-US" dirty="0" err="1"/>
-              <a:t>neighbourhood</a:t>
-            </a:r>
-            <a:r>
-              <a:rPr lang="en-US" dirty="0"/>
-              <a:t> by plotting it on maps using Folium and perform exploratory data analysis.</a:t>
-            </a:r>
+              <a:rPr lang="en-US" b="1" dirty="0" smtClean="0"/>
+              <a:t>Gathering </a:t>
+            </a:r>
+            <a:r>
+              <a:rPr lang="en-US" b="1" dirty="0"/>
+              <a:t>additional information about the Neighborhood from Wikipedia</a:t>
+            </a:r>
+          </a:p>
+          <a:p>
+            <a:r>
+              <a:rPr lang="en-US" b="1" dirty="0"/>
+              <a:t>As part of data set Borough which the neighborhood was part of was not categorized, so we will create a dictionary of Neighborhood and based on data in the following </a:t>
+            </a:r>
+            <a:r>
+              <a:rPr lang="en-US" b="1" dirty="0">
+                <a:hlinkClick r:id="rId2"/>
+              </a:rPr>
+              <a:t>Wikipedia page</a:t>
+            </a:r>
+            <a:r>
+              <a:rPr lang="en-US" b="1" dirty="0"/>
+              <a:t>.</a:t>
+            </a:r>
+          </a:p>
+          <a:p>
+            <a:endParaRPr lang="en-US" dirty="0"/>
           </a:p>
         </p:txBody>
       </p:sp>
     </p:spTree>
     <p:extLst>
       <p:ext uri="{BB962C8B-B14F-4D97-AF65-F5344CB8AC3E}">
-        <p14:creationId xmlns:p14="http://schemas.microsoft.com/office/powerpoint/2010/main" val="918173466"/>
+        <p14:creationId xmlns:p14="http://schemas.microsoft.com/office/powerpoint/2010/main" val="1164860255"/>
       </p:ext>
     </p:extLst>
   </p:cSld>

</xml_diff>